<commit_message>
CHANGE: Resize text of timeline
</commit_message>
<xml_diff>
--- a/assets/tidslinje.pptx
+++ b/assets/tidslinje.pptx
@@ -5331,7 +5331,12 @@
             <p:ph type="body" sz="quarter" idx="14"/>
           </p:nvPr>
         </p:nvSpPr>
-        <p:spPr/>
+        <p:spPr>
+          <a:xfrm>
+            <a:off x="439643" y="4595454"/>
+            <a:ext cx="2158999" cy="601662"/>
+          </a:xfrm>
+        </p:spPr>
         <p:txBody>
           <a:bodyPr vert="horz" lIns="91440" tIns="45720" rIns="91440" bIns="45720" rtlCol="0" anchor="t">
             <a:noAutofit/>
@@ -5339,11 +5344,11 @@
           <a:lstStyle/>
           <a:p>
             <a:r>
-              <a:rPr lang="sv-SE" dirty="0"/>
+              <a:rPr lang="sv-SE" sz="1800" dirty="0"/>
               <a:t>Ransundet grundas av </a:t>
             </a:r>
             <a:r>
-              <a:rPr lang="sv-SE" dirty="0">
+              <a:rPr lang="sv-SE" sz="1800" dirty="0">
                 <a:ea typeface="+mn-lt"/>
                 <a:cs typeface="+mn-lt"/>
               </a:rPr>
@@ -5371,7 +5376,12 @@
             <p:ph type="body" sz="quarter" idx="15"/>
           </p:nvPr>
         </p:nvSpPr>
-        <p:spPr/>
+        <p:spPr>
+          <a:xfrm>
+            <a:off x="3580137" y="4595454"/>
+            <a:ext cx="1983726" cy="601662"/>
+          </a:xfrm>
+        </p:spPr>
         <p:txBody>
           <a:bodyPr vert="horz" lIns="91440" tIns="45720" rIns="91440" bIns="45720" rtlCol="0" anchor="t">
             <a:noAutofit/>
@@ -5379,7 +5389,7 @@
           <a:lstStyle/>
           <a:p>
             <a:r>
-              <a:rPr lang="sv-SE" dirty="0"/>
+              <a:rPr lang="sv-SE" sz="1800" dirty="0"/>
               <a:t>Väg bryts till byn och blir därmed mer tillgänglig.</a:t>
             </a:r>
           </a:p>
@@ -5404,13 +5414,18 @@
             <p:ph type="body" sz="quarter" idx="16"/>
           </p:nvPr>
         </p:nvSpPr>
-        <p:spPr/>
+        <p:spPr>
+          <a:xfrm>
+            <a:off x="6093571" y="4592819"/>
+            <a:ext cx="3047999" cy="601662"/>
+          </a:xfrm>
+        </p:spPr>
         <p:txBody>
           <a:bodyPr/>
           <a:lstStyle/>
           <a:p>
             <a:r>
-              <a:rPr lang="sv-SE" sz="1100" dirty="0"/>
+              <a:rPr lang="sv-SE" sz="1800" dirty="0"/>
               <a:t>Ransundets vilthägn invigs, som lockar många turister under de kommande decennierna.</a:t>
             </a:r>
           </a:p>
@@ -5435,13 +5450,18 @@
             <p:ph type="body" sz="quarter" idx="17"/>
           </p:nvPr>
         </p:nvSpPr>
-        <p:spPr/>
+        <p:spPr>
+          <a:xfrm>
+            <a:off x="9676135" y="4592819"/>
+            <a:ext cx="1983726" cy="601662"/>
+          </a:xfrm>
+        </p:spPr>
         <p:txBody>
           <a:bodyPr/>
           <a:lstStyle/>
           <a:p>
             <a:r>
-              <a:rPr lang="sv-SE" dirty="0"/>
+              <a:rPr lang="sv-SE" sz="1800" dirty="0"/>
               <a:t>Gatubelysning sätts upp i byn.</a:t>
             </a:r>
           </a:p>
@@ -5471,10 +5491,10 @@
           <a:lstStyle/>
           <a:p>
             <a:r>
-              <a:rPr lang="en-US" dirty="0"/>
+              <a:rPr lang="en-US" sz="3200" dirty="0"/>
               <a:t>1825</a:t>
             </a:r>
-            <a:endParaRPr lang="en-US" b="1" dirty="0">
+            <a:endParaRPr lang="en-US" sz="3200" b="1" dirty="0">
               <a:latin typeface="+mj-lt"/>
             </a:endParaRPr>
           </a:p>
@@ -5507,10 +5527,10 @@
           <a:lstStyle/>
           <a:p>
             <a:r>
-              <a:rPr lang="en-US" dirty="0"/>
+              <a:rPr lang="en-US" sz="3200" dirty="0"/>
               <a:t>1936</a:t>
             </a:r>
-            <a:endParaRPr lang="en-US" b="1" dirty="0">
+            <a:endParaRPr lang="en-US" sz="3200" b="1" dirty="0">
               <a:latin typeface="+mj-lt"/>
             </a:endParaRPr>
           </a:p>
@@ -5543,7 +5563,7 @@
           <a:lstStyle/>
           <a:p>
             <a:r>
-              <a:rPr lang="en-US" dirty="0"/>
+              <a:rPr lang="en-US" sz="3200" dirty="0"/>
               <a:t>1971</a:t>
             </a:r>
           </a:p>
@@ -5573,7 +5593,7 @@
           <a:lstStyle/>
           <a:p>
             <a:r>
-              <a:rPr lang="en-US" dirty="0"/>
+              <a:rPr lang="en-US" sz="3200" dirty="0"/>
               <a:t>2003</a:t>
             </a:r>
           </a:p>
@@ -6404,24 +6424,6 @@
 </file>
 
 <file path=customXml/item1.xml><?xml version="1.0" encoding="utf-8"?>
-<p:properties xmlns:p="http://schemas.microsoft.com/office/2006/metadata/properties" xmlns:xsi="http://www.w3.org/2001/XMLSchema-instance" xmlns:pc="http://schemas.microsoft.com/office/infopath/2007/PartnerControls">
-  <documentManagement>
-    <Status xmlns="71af3243-3dd4-4a8d-8c0d-dd76da1f02a5">Not started</Status>
-    <MediaServiceKeyPoints xmlns="71af3243-3dd4-4a8d-8c0d-dd76da1f02a5" xsi:nil="true"/>
-  </documentManagement>
-</p:properties>
-</file>
-
-<file path=customXml/item2.xml><?xml version="1.0" encoding="utf-8"?>
-<?mso-contentType ?>
-<FormTemplates xmlns="http://schemas.microsoft.com/sharepoint/v3/contenttype/forms">
-  <Display>DocumentLibraryForm</Display>
-  <Edit>DocumentLibraryForm</Edit>
-  <New>DocumentLibraryForm</New>
-</FormTemplates>
-</file>
-
-<file path=customXml/item3.xml><?xml version="1.0" encoding="utf-8"?>
 <ct:contentTypeSchema xmlns:ct="http://schemas.microsoft.com/office/2006/metadata/contentType" xmlns:ma="http://schemas.microsoft.com/office/2006/metadata/properties/metaAttributes" ct:_="" ma:_="" ma:contentTypeName="Document" ma:contentTypeID="0x01010079F111ED35F8CC479449609E8A0923A6" ma:contentTypeVersion="12" ma:contentTypeDescription="Create a new document." ma:contentTypeScope="" ma:versionID="426e97fa315356fffbdcd9876fe988c2">
   <xsd:schema xmlns:xsd="http://www.w3.org/2001/XMLSchema" xmlns:xs="http://www.w3.org/2001/XMLSchema" xmlns:p="http://schemas.microsoft.com/office/2006/metadata/properties" xmlns:ns2="71af3243-3dd4-4a8d-8c0d-dd76da1f02a5" xmlns:ns3="16c05727-aa75-4e4a-9b5f-8a80a1165891" targetNamespace="http://schemas.microsoft.com/office/2006/metadata/properties" ma:root="true" ma:fieldsID="14b8f0def80e6d70ce3def20c90759ae" ns2:_="" ns3:_="">
     <xsd:import namespace="71af3243-3dd4-4a8d-8c0d-dd76da1f02a5"/>
@@ -6642,25 +6644,25 @@
 </ct:contentTypeSchema>
 </file>
 
-<file path=customXml/itemProps1.xml><?xml version="1.0" encoding="utf-8"?>
-<ds:datastoreItem xmlns:ds="http://schemas.openxmlformats.org/officeDocument/2006/customXml" ds:itemID="{99049FB4-E04C-4A47-A7EB-D9A7EE3720B6}">
-  <ds:schemaRefs>
-    <ds:schemaRef ds:uri="http://schemas.microsoft.com/office/2006/metadata/properties"/>
-    <ds:schemaRef ds:uri="http://schemas.microsoft.com/office/infopath/2007/PartnerControls"/>
-    <ds:schemaRef ds:uri="71af3243-3dd4-4a8d-8c0d-dd76da1f02a5"/>
-  </ds:schemaRefs>
-</ds:datastoreItem>
+<file path=customXml/item2.xml><?xml version="1.0" encoding="utf-8"?>
+<?mso-contentType ?>
+<FormTemplates xmlns="http://schemas.microsoft.com/sharepoint/v3/contenttype/forms">
+  <Display>DocumentLibraryForm</Display>
+  <Edit>DocumentLibraryForm</Edit>
+  <New>DocumentLibraryForm</New>
+</FormTemplates>
 </file>
 
-<file path=customXml/itemProps2.xml><?xml version="1.0" encoding="utf-8"?>
-<ds:datastoreItem xmlns:ds="http://schemas.openxmlformats.org/officeDocument/2006/customXml" ds:itemID="{F099EBB6-D1EF-4345-A0D5-56C8432B26EA}">
-  <ds:schemaRefs>
-    <ds:schemaRef ds:uri="http://schemas.microsoft.com/sharepoint/v3/contenttype/forms"/>
-  </ds:schemaRefs>
-</ds:datastoreItem>
+<file path=customXml/item3.xml><?xml version="1.0" encoding="utf-8"?>
+<p:properties xmlns:p="http://schemas.microsoft.com/office/2006/metadata/properties" xmlns:xsi="http://www.w3.org/2001/XMLSchema-instance" xmlns:pc="http://schemas.microsoft.com/office/infopath/2007/PartnerControls">
+  <documentManagement>
+    <Status xmlns="71af3243-3dd4-4a8d-8c0d-dd76da1f02a5">Not started</Status>
+    <MediaServiceKeyPoints xmlns="71af3243-3dd4-4a8d-8c0d-dd76da1f02a5" xsi:nil="true"/>
+  </documentManagement>
+</p:properties>
 </file>
 
-<file path=customXml/itemProps3.xml><?xml version="1.0" encoding="utf-8"?>
+<file path=customXml/itemProps1.xml><?xml version="1.0" encoding="utf-8"?>
 <ds:datastoreItem xmlns:ds="http://schemas.openxmlformats.org/officeDocument/2006/customXml" ds:itemID="{AE7F63A3-93DF-4331-8C04-BB726C702AF2}">
   <ds:schemaRefs>
     <ds:schemaRef ds:uri="http://schemas.microsoft.com/office/2006/metadata/contentType"/>
@@ -6677,4 +6679,22 @@
     <ds:schemaRef ds:uri="http://schemas.microsoft.com/internal/obd"/>
   </ds:schemaRefs>
 </ds:datastoreItem>
+</file>
+
+<file path=customXml/itemProps2.xml><?xml version="1.0" encoding="utf-8"?>
+<ds:datastoreItem xmlns:ds="http://schemas.openxmlformats.org/officeDocument/2006/customXml" ds:itemID="{F099EBB6-D1EF-4345-A0D5-56C8432B26EA}">
+  <ds:schemaRefs>
+    <ds:schemaRef ds:uri="http://schemas.microsoft.com/sharepoint/v3/contenttype/forms"/>
+  </ds:schemaRefs>
+</ds:datastoreItem>
+</file>
+
+<file path=customXml/itemProps3.xml><?xml version="1.0" encoding="utf-8"?>
+<ds:datastoreItem xmlns:ds="http://schemas.openxmlformats.org/officeDocument/2006/customXml" ds:itemID="{99049FB4-E04C-4A47-A7EB-D9A7EE3720B6}">
+  <ds:schemaRefs>
+    <ds:schemaRef ds:uri="http://schemas.microsoft.com/office/2006/metadata/properties"/>
+    <ds:schemaRef ds:uri="http://schemas.microsoft.com/office/infopath/2007/PartnerControls"/>
+    <ds:schemaRef ds:uri="71af3243-3dd4-4a8d-8c0d-dd76da1f02a5"/>
+  </ds:schemaRefs>
+</ds:datastoreItem>
 </file>
</xml_diff>